<commit_message>
1. add scores 2. update slides
</commit_message>
<xml_diff>
--- a/doc/report/revenue-prediction.pptx
+++ b/doc/report/revenue-prediction.pptx
@@ -10,7 +10,11 @@
     <p:sldId id="258" r:id="rId4"/>
     <p:sldId id="259" r:id="rId5"/>
     <p:sldId id="261" r:id="rId6"/>
-    <p:sldId id="260" r:id="rId7"/>
+    <p:sldId id="262" r:id="rId7"/>
+    <p:sldId id="260" r:id="rId8"/>
+    <p:sldId id="263" r:id="rId9"/>
+    <p:sldId id="264" r:id="rId10"/>
+    <p:sldId id="265" r:id="rId11"/>
   </p:sldIdLst>
   <p:sldSz cx="9144000" cy="6858000" type="screen4x3"/>
   <p:notesSz cx="6858000" cy="9144000"/>
@@ -294,7 +298,7 @@
             <a:fld id="{1D8BD707-D9CF-40AE-B4C6-C98DA3205C09}" type="datetimeFigureOut">
               <a:rPr lang="en-US" smtClean="0"/>
               <a:pPr/>
-              <a:t>4/21/2015</a:t>
+              <a:t>4/27/15</a:t>
             </a:fld>
             <a:endParaRPr lang="en-US"/>
           </a:p>
@@ -461,7 +465,7 @@
             <a:fld id="{1D8BD707-D9CF-40AE-B4C6-C98DA3205C09}" type="datetimeFigureOut">
               <a:rPr lang="en-US" smtClean="0"/>
               <a:pPr/>
-              <a:t>4/21/2015</a:t>
+              <a:t>4/27/15</a:t>
             </a:fld>
             <a:endParaRPr lang="en-US"/>
           </a:p>
@@ -638,7 +642,7 @@
             <a:fld id="{1D8BD707-D9CF-40AE-B4C6-C98DA3205C09}" type="datetimeFigureOut">
               <a:rPr lang="en-US" smtClean="0"/>
               <a:pPr/>
-              <a:t>4/21/2015</a:t>
+              <a:t>4/27/15</a:t>
             </a:fld>
             <a:endParaRPr lang="en-US"/>
           </a:p>
@@ -805,7 +809,7 @@
             <a:fld id="{1D8BD707-D9CF-40AE-B4C6-C98DA3205C09}" type="datetimeFigureOut">
               <a:rPr lang="en-US" smtClean="0"/>
               <a:pPr/>
-              <a:t>4/21/2015</a:t>
+              <a:t>4/27/15</a:t>
             </a:fld>
             <a:endParaRPr lang="en-US"/>
           </a:p>
@@ -1048,7 +1052,7 @@
             <a:fld id="{1D8BD707-D9CF-40AE-B4C6-C98DA3205C09}" type="datetimeFigureOut">
               <a:rPr lang="en-US" smtClean="0"/>
               <a:pPr/>
-              <a:t>4/21/2015</a:t>
+              <a:t>4/27/15</a:t>
             </a:fld>
             <a:endParaRPr lang="en-US"/>
           </a:p>
@@ -1333,7 +1337,7 @@
             <a:fld id="{1D8BD707-D9CF-40AE-B4C6-C98DA3205C09}" type="datetimeFigureOut">
               <a:rPr lang="en-US" smtClean="0"/>
               <a:pPr/>
-              <a:t>4/21/2015</a:t>
+              <a:t>4/27/15</a:t>
             </a:fld>
             <a:endParaRPr lang="en-US"/>
           </a:p>
@@ -1752,7 +1756,7 @@
             <a:fld id="{1D8BD707-D9CF-40AE-B4C6-C98DA3205C09}" type="datetimeFigureOut">
               <a:rPr lang="en-US" smtClean="0"/>
               <a:pPr/>
-              <a:t>4/21/2015</a:t>
+              <a:t>4/27/15</a:t>
             </a:fld>
             <a:endParaRPr lang="en-US"/>
           </a:p>
@@ -1867,7 +1871,7 @@
             <a:fld id="{1D8BD707-D9CF-40AE-B4C6-C98DA3205C09}" type="datetimeFigureOut">
               <a:rPr lang="en-US" smtClean="0"/>
               <a:pPr/>
-              <a:t>4/21/2015</a:t>
+              <a:t>4/27/15</a:t>
             </a:fld>
             <a:endParaRPr lang="en-US"/>
           </a:p>
@@ -1959,7 +1963,7 @@
             <a:fld id="{1D8BD707-D9CF-40AE-B4C6-C98DA3205C09}" type="datetimeFigureOut">
               <a:rPr lang="en-US" smtClean="0"/>
               <a:pPr/>
-              <a:t>4/21/2015</a:t>
+              <a:t>4/27/15</a:t>
             </a:fld>
             <a:endParaRPr lang="en-US"/>
           </a:p>
@@ -2233,7 +2237,7 @@
             <a:fld id="{1D8BD707-D9CF-40AE-B4C6-C98DA3205C09}" type="datetimeFigureOut">
               <a:rPr lang="en-US" smtClean="0"/>
               <a:pPr/>
-              <a:t>4/21/2015</a:t>
+              <a:t>4/27/15</a:t>
             </a:fld>
             <a:endParaRPr lang="en-US"/>
           </a:p>
@@ -2483,7 +2487,7 @@
             <a:fld id="{1D8BD707-D9CF-40AE-B4C6-C98DA3205C09}" type="datetimeFigureOut">
               <a:rPr lang="en-US" smtClean="0"/>
               <a:pPr/>
-              <a:t>4/21/2015</a:t>
+              <a:t>4/27/15</a:t>
             </a:fld>
             <a:endParaRPr lang="en-US"/>
           </a:p>
@@ -2693,7 +2697,7 @@
             <a:fld id="{1D8BD707-D9CF-40AE-B4C6-C98DA3205C09}" type="datetimeFigureOut">
               <a:rPr lang="en-US" smtClean="0"/>
               <a:pPr/>
-              <a:t>4/21/2015</a:t>
+              <a:t>4/27/15</a:t>
             </a:fld>
             <a:endParaRPr lang="en-US"/>
           </a:p>
@@ -3076,17 +3080,34 @@
         </p:nvSpPr>
         <p:spPr>
           <a:xfrm>
-            <a:off x="762000" y="1295400"/>
-            <a:ext cx="7772400" cy="1470025"/>
+            <a:off x="0" y="1295400"/>
+            <a:ext cx="9144000" cy="2286000"/>
           </a:xfrm>
         </p:spPr>
         <p:txBody>
-          <a:bodyPr/>
-          <a:lstStyle/>
-          <a:p>
+          <a:bodyPr>
+            <a:normAutofit/>
+          </a:bodyPr>
+          <a:lstStyle/>
+          <a:p>
+            <a:r>
+              <a:rPr lang="en-US" sz="3600" dirty="0" smtClean="0"/>
+              <a:t>CS 659 Course Project</a:t>
+            </a:r>
             <a:r>
               <a:rPr lang="en-US" dirty="0" smtClean="0"/>
-              <a:t>Restaurant Revenue Prediction</a:t>
+              <a:t/>
+            </a:r>
+            <a:br>
+              <a:rPr lang="en-US" dirty="0" smtClean="0"/>
+            </a:br>
+            <a:r>
+              <a:rPr lang="en-US" dirty="0" smtClean="0"/>
+              <a:t>Restaurant </a:t>
+            </a:r>
+            <a:r>
+              <a:rPr lang="en-US" dirty="0" smtClean="0"/>
+              <a:t>Revenue Prediction</a:t>
             </a:r>
             <a:endParaRPr lang="en-US" dirty="0"/>
           </a:p>
@@ -3107,18 +3128,14 @@
           <a:bodyPr/>
           <a:lstStyle/>
           <a:p>
-            <a:pPr algn="r"/>
-            <a:r>
-              <a:rPr lang="en-US" dirty="0" err="1" smtClean="0"/>
-              <a:t>Zhonghua</a:t>
-            </a:r>
             <a:r>
               <a:rPr lang="en-US" dirty="0" smtClean="0"/>
-              <a:t> Xi</a:t>
-            </a:r>
-          </a:p>
-          <a:p>
-            <a:pPr algn="r"/>
+              <a:t>Zhonghua </a:t>
+            </a:r>
+            <a:r>
+              <a:rPr lang="en-US" dirty="0" smtClean="0"/>
+              <a:t>Xi and </a:t>
+            </a:r>
             <a:r>
               <a:rPr lang="en-US" dirty="0" err="1" smtClean="0"/>
               <a:t>Huangxin</a:t>
@@ -3126,6 +3143,12 @@
             <a:r>
               <a:rPr lang="en-US" dirty="0" smtClean="0"/>
               <a:t> Wang</a:t>
+            </a:r>
+          </a:p>
+          <a:p>
+            <a:r>
+              <a:rPr lang="en-US" dirty="0" smtClean="0"/>
+              <a:t>May. 2015</a:t>
             </a:r>
             <a:endParaRPr lang="en-US" dirty="0"/>
           </a:p>
@@ -3135,6 +3158,89 @@
     <p:extLst>
       <p:ext uri="{BB962C8B-B14F-4D97-AF65-F5344CB8AC3E}">
         <p14:creationId xmlns:p14="http://schemas.microsoft.com/office/powerpoint/2010/main" val="2068897922"/>
+      </p:ext>
+    </p:extLst>
+  </p:cSld>
+  <p:clrMapOvr>
+    <a:masterClrMapping/>
+  </p:clrMapOvr>
+  <p:timing>
+    <p:tnLst>
+      <p:par>
+        <p:cTn xmlns:p14="http://schemas.microsoft.com/office/powerpoint/2010/main" id="1" dur="indefinite" restart="never" nodeType="tmRoot"/>
+      </p:par>
+    </p:tnLst>
+  </p:timing>
+</p:sld>
+</file>
+
+<file path=ppt/slides/slide10.xml><?xml version="1.0" encoding="utf-8"?>
+<p:sld xmlns:a="http://schemas.openxmlformats.org/drawingml/2006/main" xmlns:r="http://schemas.openxmlformats.org/officeDocument/2006/relationships" xmlns:p="http://schemas.openxmlformats.org/presentationml/2006/main">
+  <p:cSld>
+    <p:spTree>
+      <p:nvGrpSpPr>
+        <p:cNvPr id="1" name=""/>
+        <p:cNvGrpSpPr/>
+        <p:nvPr/>
+      </p:nvGrpSpPr>
+      <p:grpSpPr>
+        <a:xfrm>
+          <a:off x="0" y="0"/>
+          <a:ext cx="0" cy="0"/>
+          <a:chOff x="0" y="0"/>
+          <a:chExt cx="0" cy="0"/>
+        </a:xfrm>
+      </p:grpSpPr>
+      <p:sp>
+        <p:nvSpPr>
+          <p:cNvPr id="2" name="标题 1"/>
+          <p:cNvSpPr>
+            <a:spLocks noGrp="1"/>
+          </p:cNvSpPr>
+          <p:nvPr>
+            <p:ph type="title"/>
+          </p:nvPr>
+        </p:nvSpPr>
+        <p:spPr/>
+        <p:txBody>
+          <a:bodyPr/>
+          <a:lstStyle/>
+          <a:p>
+            <a:r>
+              <a:rPr kumimoji="1" lang="en-US" altLang="zh-CN" dirty="0" smtClean="0"/>
+              <a:t>Conclusion</a:t>
+            </a:r>
+            <a:endParaRPr kumimoji="1" lang="zh-CN" altLang="en-US" dirty="0"/>
+          </a:p>
+        </p:txBody>
+      </p:sp>
+      <p:sp>
+        <p:nvSpPr>
+          <p:cNvPr id="3" name="内容占位符 2"/>
+          <p:cNvSpPr>
+            <a:spLocks noGrp="1"/>
+          </p:cNvSpPr>
+          <p:nvPr>
+            <p:ph idx="1"/>
+          </p:nvPr>
+        </p:nvSpPr>
+        <p:spPr/>
+        <p:txBody>
+          <a:bodyPr/>
+          <a:lstStyle/>
+          <a:p>
+            <a:r>
+              <a:rPr kumimoji="1" lang="en-US" altLang="zh-CN" dirty="0" smtClean="0"/>
+              <a:t>TODO</a:t>
+            </a:r>
+            <a:endParaRPr kumimoji="1" lang="zh-CN" altLang="en-US" dirty="0"/>
+          </a:p>
+        </p:txBody>
+      </p:sp>
+    </p:spTree>
+    <p:extLst>
+      <p:ext uri="{BB962C8B-B14F-4D97-AF65-F5344CB8AC3E}">
+        <p14:creationId xmlns:p14="http://schemas.microsoft.com/office/powerpoint/2010/main" val="2140007671"/>
       </p:ext>
     </p:extLst>
   </p:cSld>
@@ -3200,13 +3306,25 @@
           <a:lstStyle/>
           <a:p>
             <a:r>
+              <a:rPr lang="en-US" dirty="0" smtClean="0"/>
+              <a:t>A </a:t>
+            </a:r>
+            <a:r>
               <a:rPr lang="en-US" dirty="0" err="1" smtClean="0"/>
               <a:t>Kaggle</a:t>
             </a:r>
             <a:r>
               <a:rPr lang="en-US" dirty="0" smtClean="0"/>
-              <a:t> test</a:t>
-            </a:r>
+              <a:t> Competition</a:t>
+            </a:r>
+          </a:p>
+          <a:p>
+            <a:pPr lvl="1"/>
+            <a:r>
+              <a:rPr lang="en-US" dirty="0" smtClean="0"/>
+              <a:t>2292 Teams, 2499 Players, 27735 entries</a:t>
+            </a:r>
+            <a:endParaRPr lang="en-US" dirty="0" smtClean="0"/>
           </a:p>
           <a:p>
             <a:r>
@@ -3228,60 +3346,101 @@
           </a:p>
         </p:txBody>
       </p:sp>
-      <p:pic>
-        <p:nvPicPr>
-          <p:cNvPr id="1026" name="Picture 2"/>
-          <p:cNvPicPr>
-            <a:picLocks noChangeAspect="1" noChangeArrowheads="1"/>
-          </p:cNvPicPr>
+      <p:grpSp>
+        <p:nvGrpSpPr>
+          <p:cNvPr id="5" name="组 4"/>
+          <p:cNvGrpSpPr>
+            <a:grpSpLocks noChangeAspect="1"/>
+          </p:cNvGrpSpPr>
           <p:nvPr/>
-        </p:nvPicPr>
-        <p:blipFill>
-          <a:blip r:embed="rId2">
+        </p:nvGrpSpPr>
+        <p:grpSpPr>
+          <a:xfrm>
+            <a:off x="-26545" y="4343400"/>
+            <a:ext cx="9198155" cy="1755648"/>
+            <a:chOff x="-34311" y="4114800"/>
+            <a:chExt cx="8623270" cy="1645920"/>
+          </a:xfrm>
+        </p:grpSpPr>
+        <p:pic>
+          <p:nvPicPr>
+            <p:cNvPr id="1026" name="Picture 2"/>
+            <p:cNvPicPr>
+              <a:picLocks noChangeAspect="1" noChangeArrowheads="1"/>
+            </p:cNvPicPr>
+            <p:nvPr/>
+          </p:nvPicPr>
+          <p:blipFill>
+            <a:blip r:embed="rId2">
+              <a:extLst>
+                <a:ext uri="{28A0092B-C50C-407E-A947-70E740481C1C}">
+                  <a14:useLocalDpi xmlns:a14="http://schemas.microsoft.com/office/drawing/2010/main" val="0"/>
+                </a:ext>
+              </a:extLst>
+            </a:blip>
+            <a:srcRect/>
+            <a:stretch>
+              <a:fillRect/>
+            </a:stretch>
+          </p:blipFill>
+          <p:spPr bwMode="auto">
+            <a:xfrm>
+              <a:off x="3429000" y="4114800"/>
+              <a:ext cx="5159959" cy="1645920"/>
+            </a:xfrm>
+            <a:prstGeom prst="rect">
+              <a:avLst/>
+            </a:prstGeom>
+            <a:noFill/>
+            <a:ln>
+              <a:noFill/>
+            </a:ln>
             <a:extLst>
-              <a:ext uri="{28A0092B-C50C-407E-A947-70E740481C1C}">
-                <a14:useLocalDpi xmlns:a14="http://schemas.microsoft.com/office/drawing/2010/main" val="0"/>
+              <a:ext uri="{909E8E84-426E-40dd-AFC4-6F175D3DCCD1}">
+                <a14:hiddenFill xmlns:a14="http://schemas.microsoft.com/office/drawing/2010/main">
+                  <a:solidFill>
+                    <a:schemeClr val="accent1"/>
+                  </a:solidFill>
+                </a14:hiddenFill>
+              </a:ext>
+              <a:ext uri="{91240B29-F687-4f45-9708-019B960494DF}">
+                <a14:hiddenLine xmlns:a14="http://schemas.microsoft.com/office/drawing/2010/main" w="9525">
+                  <a:solidFill>
+                    <a:schemeClr val="tx1"/>
+                  </a:solidFill>
+                  <a:miter lim="800000"/>
+                  <a:headEnd/>
+                  <a:tailEnd/>
+                </a14:hiddenLine>
               </a:ext>
             </a:extLst>
-          </a:blip>
-          <a:srcRect/>
-          <a:stretch>
-            <a:fillRect/>
-          </a:stretch>
-        </p:blipFill>
-        <p:spPr bwMode="auto">
-          <a:xfrm>
-            <a:off x="990600" y="4038600"/>
-            <a:ext cx="5972175" cy="1905000"/>
-          </a:xfrm>
-          <a:prstGeom prst="rect">
-            <a:avLst/>
-          </a:prstGeom>
-          <a:noFill/>
-          <a:ln>
-            <a:noFill/>
-          </a:ln>
-          <a:extLst>
-            <a:ext uri="{909E8E84-426E-40DD-AFC4-6F175D3DCCD1}">
-              <a14:hiddenFill xmlns:a14="http://schemas.microsoft.com/office/drawing/2010/main">
-                <a:solidFill>
-                  <a:schemeClr val="accent1"/>
-                </a:solidFill>
-              </a14:hiddenFill>
-            </a:ext>
-            <a:ext uri="{91240B29-F687-4F45-9708-019B960494DF}">
-              <a14:hiddenLine xmlns:a14="http://schemas.microsoft.com/office/drawing/2010/main" w="9525">
-                <a:solidFill>
-                  <a:schemeClr val="tx1"/>
-                </a:solidFill>
-                <a:miter lim="800000"/>
-                <a:headEnd/>
-                <a:tailEnd/>
-              </a14:hiddenLine>
-            </a:ext>
-          </a:extLst>
-        </p:spPr>
-      </p:pic>
+          </p:spPr>
+        </p:pic>
+        <p:pic>
+          <p:nvPicPr>
+            <p:cNvPr id="4" name="图片 3"/>
+            <p:cNvPicPr>
+              <a:picLocks noChangeAspect="1"/>
+            </p:cNvPicPr>
+            <p:nvPr/>
+          </p:nvPicPr>
+          <p:blipFill>
+            <a:blip r:embed="rId3"/>
+            <a:stretch>
+              <a:fillRect/>
+            </a:stretch>
+          </p:blipFill>
+          <p:spPr>
+            <a:xfrm>
+              <a:off x="-34311" y="4114800"/>
+              <a:ext cx="3505809" cy="1645920"/>
+            </a:xfrm>
+            <a:prstGeom prst="rect">
+              <a:avLst/>
+            </a:prstGeom>
+          </p:spPr>
+        </p:pic>
+      </p:grpSp>
     </p:spTree>
     <p:extLst>
       <p:ext uri="{BB962C8B-B14F-4D97-AF65-F5344CB8AC3E}">
@@ -3292,6 +3451,13 @@
   <p:clrMapOvr>
     <a:masterClrMapping/>
   </p:clrMapOvr>
+  <p:timing>
+    <p:tnLst>
+      <p:par>
+        <p:cTn xmlns:p14="http://schemas.microsoft.com/office/powerpoint/2010/main" id="1" dur="indefinite" restart="never" nodeType="tmRoot"/>
+      </p:par>
+    </p:tnLst>
+  </p:timing>
 </p:sld>
 </file>
 
@@ -3329,7 +3495,7 @@
           <a:p>
             <a:r>
               <a:rPr lang="en-US" dirty="0" smtClean="0"/>
-              <a:t>Data</a:t>
+              <a:t>Dataset</a:t>
             </a:r>
             <a:endParaRPr lang="en-US" dirty="0"/>
           </a:p>
@@ -3345,9 +3511,16 @@
             <p:ph idx="1"/>
           </p:nvPr>
         </p:nvSpPr>
-        <p:spPr/>
-        <p:txBody>
-          <a:bodyPr/>
+        <p:spPr>
+          <a:xfrm>
+            <a:off x="457200" y="1600200"/>
+            <a:ext cx="8229600" cy="5029200"/>
+          </a:xfrm>
+        </p:spPr>
+        <p:txBody>
+          <a:bodyPr>
+            <a:normAutofit fontScale="92500" lnSpcReduction="20000"/>
+          </a:bodyPr>
           <a:lstStyle/>
           <a:p>
             <a:r>
@@ -3358,28 +3531,79 @@
           <a:p>
             <a:pPr lvl="1"/>
             <a:r>
+              <a:rPr lang="en-US" altLang="zh-CN" dirty="0" smtClean="0"/>
+              <a:t>T</a:t>
+            </a:r>
+            <a:r>
               <a:rPr lang="en-US" dirty="0" smtClean="0"/>
-              <a:t>training set: 137 records</a:t>
-            </a:r>
+              <a:t>raining</a:t>
+            </a:r>
+            <a:r>
+              <a:rPr lang="zh-CN" altLang="en-US" dirty="0" smtClean="0"/>
+              <a:t> </a:t>
+            </a:r>
+            <a:r>
+              <a:rPr lang="en-US" altLang="zh-CN" dirty="0" smtClean="0"/>
+              <a:t>/</a:t>
+            </a:r>
+            <a:r>
+              <a:rPr lang="en-US" dirty="0" smtClean="0"/>
+              <a:t> </a:t>
+            </a:r>
+            <a:r>
+              <a:rPr lang="en-US" altLang="zh-CN" dirty="0" smtClean="0"/>
+              <a:t>Test</a:t>
+            </a:r>
+            <a:r>
+              <a:rPr lang="zh-CN" altLang="en-US" dirty="0" smtClean="0"/>
+              <a:t> </a:t>
+            </a:r>
+            <a:r>
+              <a:rPr lang="en-US" dirty="0" smtClean="0"/>
+              <a:t>: </a:t>
+            </a:r>
+            <a:r>
+              <a:rPr lang="en-US" dirty="0" smtClean="0"/>
+              <a:t>137 </a:t>
+            </a:r>
+            <a:r>
+              <a:rPr lang="en-US" altLang="zh-CN" dirty="0" smtClean="0"/>
+              <a:t>/</a:t>
+            </a:r>
+            <a:r>
+              <a:rPr lang="zh-CN" altLang="en-US" dirty="0" smtClean="0"/>
+              <a:t> </a:t>
+            </a:r>
+            <a:r>
+              <a:rPr lang="en-US" dirty="0" smtClean="0"/>
+              <a:t>10000</a:t>
+            </a:r>
+            <a:r>
+              <a:rPr lang="en-US" altLang="zh-CN" dirty="0" smtClean="0"/>
+              <a:t>0</a:t>
+            </a:r>
+            <a:r>
+              <a:rPr lang="en-US" dirty="0" smtClean="0"/>
+              <a:t> records</a:t>
+            </a:r>
+            <a:endParaRPr lang="en-US" dirty="0" smtClean="0"/>
+          </a:p>
+          <a:p>
+            <a:r>
+              <a:rPr lang="en-US" altLang="zh-CN" dirty="0" smtClean="0"/>
+              <a:t>Attributes</a:t>
+            </a:r>
+            <a:endParaRPr lang="en-US" dirty="0" smtClean="0"/>
           </a:p>
           <a:p>
             <a:pPr lvl="1"/>
             <a:r>
               <a:rPr lang="en-US" dirty="0" smtClean="0"/>
-              <a:t>Testing set: 10000 records</a:t>
-            </a:r>
-          </a:p>
-          <a:p>
+              <a:t>Open </a:t>
+            </a:r>
             <a:r>
               <a:rPr lang="en-US" dirty="0" smtClean="0"/>
-              <a:t>Data contents</a:t>
-            </a:r>
-          </a:p>
-          <a:p>
-            <a:pPr lvl="1"/>
-            <a:r>
-              <a:rPr lang="en-US" dirty="0" smtClean="0"/>
-              <a:t>Open Date</a:t>
+              <a:t>Date</a:t>
             </a:r>
           </a:p>
           <a:p>
@@ -3388,20 +3612,118 @@
               <a:rPr lang="en-US" dirty="0" smtClean="0"/>
               <a:t>City</a:t>
             </a:r>
+            <a:r>
+              <a:rPr lang="zh-CN" altLang="en-US" dirty="0" smtClean="0"/>
+              <a:t> </a:t>
+            </a:r>
+            <a:r>
+              <a:rPr lang="en-US" altLang="zh-CN" dirty="0" smtClean="0"/>
+              <a:t>Name</a:t>
+            </a:r>
+            <a:endParaRPr lang="en-US" dirty="0" smtClean="0"/>
           </a:p>
           <a:p>
             <a:pPr lvl="1"/>
             <a:r>
               <a:rPr lang="en-US" dirty="0" smtClean="0"/>
-              <a:t>City Group: big city, not-big-city</a:t>
-            </a:r>
+              <a:t>City Group: </a:t>
+            </a:r>
+            <a:r>
+              <a:rPr lang="en-US" dirty="0" smtClean="0"/>
+              <a:t>Big </a:t>
+            </a:r>
+            <a:r>
+              <a:rPr lang="en-US" dirty="0" smtClean="0"/>
+              <a:t>city, </a:t>
+            </a:r>
+            <a:r>
+              <a:rPr lang="en-US" dirty="0" smtClean="0"/>
+              <a:t>Others</a:t>
+            </a:r>
+            <a:endParaRPr lang="en-US" dirty="0" smtClean="0"/>
           </a:p>
           <a:p>
             <a:pPr lvl="1"/>
+            <a:r>
+              <a:rPr lang="en-US" altLang="zh-CN" dirty="0" smtClean="0"/>
+              <a:t>Restaurant</a:t>
+            </a:r>
+            <a:r>
+              <a:rPr lang="zh-CN" altLang="en-US" dirty="0" smtClean="0"/>
+              <a:t> </a:t>
+            </a:r>
             <a:r>
               <a:rPr lang="en-US" dirty="0" smtClean="0"/>
               <a:t>Type</a:t>
             </a:r>
+          </a:p>
+          <a:p>
+            <a:pPr lvl="1"/>
+            <a:r>
+              <a:rPr lang="en-US" altLang="zh-CN" dirty="0" smtClean="0"/>
+              <a:t>37</a:t>
+            </a:r>
+            <a:r>
+              <a:rPr lang="zh-CN" altLang="en-US" dirty="0" smtClean="0"/>
+              <a:t> </a:t>
+            </a:r>
+            <a:r>
+              <a:rPr lang="en-US" altLang="zh-CN" dirty="0"/>
+              <a:t>obfuscated </a:t>
+            </a:r>
+            <a:r>
+              <a:rPr lang="en-US" altLang="zh-CN" dirty="0" smtClean="0"/>
+              <a:t>numeric</a:t>
+            </a:r>
+            <a:r>
+              <a:rPr lang="zh-CN" altLang="en-US" dirty="0" smtClean="0"/>
+              <a:t> </a:t>
+            </a:r>
+            <a:r>
+              <a:rPr lang="en-US" altLang="zh-CN" dirty="0" smtClean="0"/>
+              <a:t>attributes</a:t>
+            </a:r>
+          </a:p>
+          <a:p>
+            <a:pPr lvl="2"/>
+            <a:r>
+              <a:rPr lang="en-US" altLang="zh-CN" dirty="0" smtClean="0"/>
+              <a:t>Demographic</a:t>
+            </a:r>
+            <a:r>
+              <a:rPr lang="zh-CN" altLang="en-US" dirty="0" smtClean="0"/>
+              <a:t> </a:t>
+            </a:r>
+            <a:r>
+              <a:rPr lang="en-US" altLang="zh-CN" dirty="0" smtClean="0"/>
+              <a:t>data</a:t>
+            </a:r>
+          </a:p>
+          <a:p>
+            <a:pPr lvl="2"/>
+            <a:r>
+              <a:rPr lang="en-US" altLang="zh-CN" dirty="0" smtClean="0"/>
+              <a:t>Real estate data</a:t>
+            </a:r>
+          </a:p>
+          <a:p>
+            <a:pPr lvl="2"/>
+            <a:r>
+              <a:rPr lang="en-US" altLang="zh-CN" dirty="0" smtClean="0"/>
+              <a:t>Commercial data</a:t>
+            </a:r>
+          </a:p>
+          <a:p>
+            <a:pPr lvl="1"/>
+            <a:r>
+              <a:rPr lang="en-US" altLang="zh-CN" dirty="0" smtClean="0"/>
+              <a:t>Revenue (only available in training set)</a:t>
+            </a:r>
+            <a:endParaRPr lang="zh-CN" altLang="en-US" dirty="0"/>
+          </a:p>
+          <a:p>
+            <a:pPr lvl="1"/>
+            <a:endParaRPr lang="en-US" dirty="0" smtClean="0"/>
           </a:p>
         </p:txBody>
       </p:sp>
@@ -3415,6 +3737,13 @@
   <p:clrMapOvr>
     <a:masterClrMapping/>
   </p:clrMapOvr>
+  <p:timing>
+    <p:tnLst>
+      <p:par>
+        <p:cTn xmlns:p14="http://schemas.microsoft.com/office/powerpoint/2010/main" id="1" dur="indefinite" restart="never" nodeType="tmRoot"/>
+      </p:par>
+    </p:tnLst>
+  </p:timing>
 </p:sld>
 </file>
 
@@ -3452,122 +3781,12 @@
           <a:p>
             <a:r>
               <a:rPr lang="en-US" dirty="0" smtClean="0"/>
-              <a:t>Data Analysis</a:t>
+              <a:t>Pre-processing</a:t>
             </a:r>
             <a:endParaRPr lang="en-US" dirty="0"/>
           </a:p>
         </p:txBody>
       </p:sp>
-      <p:pic>
-        <p:nvPicPr>
-          <p:cNvPr id="1026" name="Picture 2"/>
-          <p:cNvPicPr>
-            <a:picLocks noGrp="1" noChangeAspect="1" noChangeArrowheads="1"/>
-          </p:cNvPicPr>
-          <p:nvPr>
-            <p:ph idx="1"/>
-          </p:nvPr>
-        </p:nvPicPr>
-        <p:blipFill>
-          <a:blip r:embed="rId2">
-            <a:extLst>
-              <a:ext uri="{28A0092B-C50C-407E-A947-70E740481C1C}">
-                <a14:useLocalDpi xmlns:a14="http://schemas.microsoft.com/office/drawing/2010/main" val="0"/>
-              </a:ext>
-            </a:extLst>
-          </a:blip>
-          <a:srcRect/>
-          <a:stretch>
-            <a:fillRect/>
-          </a:stretch>
-        </p:blipFill>
-        <p:spPr bwMode="auto">
-          <a:xfrm>
-            <a:off x="838200" y="2133600"/>
-            <a:ext cx="6359236" cy="914400"/>
-          </a:xfrm>
-          <a:prstGeom prst="rect">
-            <a:avLst/>
-          </a:prstGeom>
-          <a:noFill/>
-          <a:ln>
-            <a:noFill/>
-          </a:ln>
-          <a:extLst>
-            <a:ext uri="{909E8E84-426E-40DD-AFC4-6F175D3DCCD1}">
-              <a14:hiddenFill xmlns:a14="http://schemas.microsoft.com/office/drawing/2010/main">
-                <a:solidFill>
-                  <a:schemeClr val="accent1"/>
-                </a:solidFill>
-              </a14:hiddenFill>
-            </a:ext>
-            <a:ext uri="{91240B29-F687-4F45-9708-019B960494DF}">
-              <a14:hiddenLine xmlns:a14="http://schemas.microsoft.com/office/drawing/2010/main" w="9525">
-                <a:solidFill>
-                  <a:schemeClr val="tx1"/>
-                </a:solidFill>
-                <a:miter lim="800000"/>
-                <a:headEnd/>
-                <a:tailEnd/>
-              </a14:hiddenLine>
-            </a:ext>
-          </a:extLst>
-        </p:spPr>
-      </p:pic>
-      <p:pic>
-        <p:nvPicPr>
-          <p:cNvPr id="1027" name="Picture 3"/>
-          <p:cNvPicPr>
-            <a:picLocks noChangeAspect="1" noChangeArrowheads="1"/>
-          </p:cNvPicPr>
-          <p:nvPr/>
-        </p:nvPicPr>
-        <p:blipFill>
-          <a:blip r:embed="rId3">
-            <a:extLst>
-              <a:ext uri="{28A0092B-C50C-407E-A947-70E740481C1C}">
-                <a14:useLocalDpi xmlns:a14="http://schemas.microsoft.com/office/drawing/2010/main" val="0"/>
-              </a:ext>
-            </a:extLst>
-          </a:blip>
-          <a:srcRect/>
-          <a:stretch>
-            <a:fillRect/>
-          </a:stretch>
-        </p:blipFill>
-        <p:spPr bwMode="auto">
-          <a:xfrm>
-            <a:off x="838200" y="3412524"/>
-            <a:ext cx="6553200" cy="1388076"/>
-          </a:xfrm>
-          <a:prstGeom prst="rect">
-            <a:avLst/>
-          </a:prstGeom>
-          <a:noFill/>
-          <a:ln>
-            <a:noFill/>
-          </a:ln>
-          <a:extLst>
-            <a:ext uri="{909E8E84-426E-40DD-AFC4-6F175D3DCCD1}">
-              <a14:hiddenFill xmlns:a14="http://schemas.microsoft.com/office/drawing/2010/main">
-                <a:solidFill>
-                  <a:schemeClr val="accent1"/>
-                </a:solidFill>
-              </a14:hiddenFill>
-            </a:ext>
-            <a:ext uri="{91240B29-F687-4F45-9708-019B960494DF}">
-              <a14:hiddenLine xmlns:a14="http://schemas.microsoft.com/office/drawing/2010/main" w="9525">
-                <a:solidFill>
-                  <a:schemeClr val="tx1"/>
-                </a:solidFill>
-                <a:miter lim="800000"/>
-                <a:headEnd/>
-                <a:tailEnd/>
-              </a14:hiddenLine>
-            </a:ext>
-          </a:extLst>
-        </p:spPr>
-      </p:pic>
       <p:sp>
         <p:nvSpPr>
           <p:cNvPr id="4" name="TextBox 3"/>
@@ -3576,8 +3795,8 @@
         </p:nvSpPr>
         <p:spPr>
           <a:xfrm>
-            <a:off x="838200" y="1295400"/>
-            <a:ext cx="627864" cy="369332"/>
+            <a:off x="457200" y="1295400"/>
+            <a:ext cx="8305800" cy="1384995"/>
           </a:xfrm>
           <a:prstGeom prst="rect">
             <a:avLst/>
@@ -3585,19 +3804,183 @@
           <a:noFill/>
         </p:spPr>
         <p:txBody>
-          <a:bodyPr wrap="none" rtlCol="0">
+          <a:bodyPr wrap="square" rtlCol="0">
             <a:spAutoFit/>
           </a:bodyPr>
           <a:lstStyle/>
           <a:p>
-            <a:r>
-              <a:rPr lang="en-US" dirty="0" smtClean="0"/>
+            <a:pPr marL="457200" indent="-457200">
+              <a:buFont typeface="Arial"/>
+              <a:buChar char="•"/>
+            </a:pPr>
+            <a:r>
+              <a:rPr lang="en-US" sz="2800" dirty="0" smtClean="0"/>
+              <a:t>Missing values in categorical attributes</a:t>
+            </a:r>
+          </a:p>
+          <a:p>
+            <a:pPr marL="914400" lvl="1" indent="-457200">
+              <a:buFont typeface="Arial"/>
+              <a:buChar char="•"/>
+            </a:pPr>
+            <a:r>
+              <a:rPr lang="en-US" sz="2800" dirty="0" smtClean="0"/>
               <a:t>Type</a:t>
             </a:r>
-            <a:endParaRPr lang="en-US" dirty="0"/>
-          </a:p>
-        </p:txBody>
-      </p:sp>
+          </a:p>
+          <a:p>
+            <a:pPr marL="914400" lvl="1" indent="-457200">
+              <a:buFont typeface="Arial"/>
+              <a:buChar char="•"/>
+            </a:pPr>
+            <a:r>
+              <a:rPr lang="en-US" sz="2800" dirty="0" smtClean="0"/>
+              <a:t>City name</a:t>
+            </a:r>
+            <a:endParaRPr lang="en-US" sz="2800" dirty="0"/>
+          </a:p>
+        </p:txBody>
+      </p:sp>
+      <p:grpSp>
+        <p:nvGrpSpPr>
+          <p:cNvPr id="13" name="组 12"/>
+          <p:cNvGrpSpPr/>
+          <p:nvPr/>
+        </p:nvGrpSpPr>
+        <p:grpSpPr>
+          <a:xfrm>
+            <a:off x="4800600" y="2819400"/>
+            <a:ext cx="3309030" cy="3645932"/>
+            <a:chOff x="4800600" y="2819400"/>
+            <a:chExt cx="3309030" cy="3645932"/>
+          </a:xfrm>
+        </p:grpSpPr>
+        <p:sp>
+          <p:nvSpPr>
+            <p:cNvPr id="11" name="文本框 10"/>
+            <p:cNvSpPr txBox="1"/>
+            <p:nvPr/>
+          </p:nvSpPr>
+          <p:spPr>
+            <a:xfrm>
+              <a:off x="4800600" y="6096000"/>
+              <a:ext cx="3276600" cy="369332"/>
+            </a:xfrm>
+            <a:prstGeom prst="rect">
+              <a:avLst/>
+            </a:prstGeom>
+            <a:noFill/>
+          </p:spPr>
+          <p:txBody>
+            <a:bodyPr wrap="square" rtlCol="0">
+              <a:spAutoFit/>
+            </a:bodyPr>
+            <a:lstStyle/>
+            <a:p>
+              <a:pPr algn="ctr"/>
+              <a:r>
+                <a:rPr kumimoji="1" lang="en-US" altLang="zh-CN" dirty="0" smtClean="0"/>
+                <a:t>Test</a:t>
+              </a:r>
+              <a:endParaRPr kumimoji="1" lang="zh-CN" altLang="en-US" dirty="0"/>
+            </a:p>
+          </p:txBody>
+        </p:sp>
+        <p:pic>
+          <p:nvPicPr>
+            <p:cNvPr id="12" name="图片 11"/>
+            <p:cNvPicPr>
+              <a:picLocks noChangeAspect="1"/>
+            </p:cNvPicPr>
+            <p:nvPr/>
+          </p:nvPicPr>
+          <p:blipFill>
+            <a:blip r:embed="rId2"/>
+            <a:stretch>
+              <a:fillRect/>
+            </a:stretch>
+          </p:blipFill>
+          <p:spPr>
+            <a:xfrm>
+              <a:off x="4800600" y="2819400"/>
+              <a:ext cx="3309030" cy="3200400"/>
+            </a:xfrm>
+            <a:prstGeom prst="rect">
+              <a:avLst/>
+            </a:prstGeom>
+          </p:spPr>
+        </p:pic>
+      </p:grpSp>
+      <p:grpSp>
+        <p:nvGrpSpPr>
+          <p:cNvPr id="15" name="组 14"/>
+          <p:cNvGrpSpPr/>
+          <p:nvPr/>
+        </p:nvGrpSpPr>
+        <p:grpSpPr>
+          <a:xfrm>
+            <a:off x="990600" y="2819400"/>
+            <a:ext cx="3359512" cy="3645932"/>
+            <a:chOff x="990600" y="2819400"/>
+            <a:chExt cx="3359512" cy="3645932"/>
+          </a:xfrm>
+        </p:grpSpPr>
+        <p:sp>
+          <p:nvSpPr>
+            <p:cNvPr id="8" name="文本框 7"/>
+            <p:cNvSpPr txBox="1"/>
+            <p:nvPr/>
+          </p:nvSpPr>
+          <p:spPr>
+            <a:xfrm>
+              <a:off x="990600" y="6096000"/>
+              <a:ext cx="3276600" cy="369332"/>
+            </a:xfrm>
+            <a:prstGeom prst="rect">
+              <a:avLst/>
+            </a:prstGeom>
+            <a:noFill/>
+          </p:spPr>
+          <p:txBody>
+            <a:bodyPr wrap="square" rtlCol="0">
+              <a:spAutoFit/>
+            </a:bodyPr>
+            <a:lstStyle/>
+            <a:p>
+              <a:pPr algn="ctr"/>
+              <a:r>
+                <a:rPr kumimoji="1" lang="en-US" altLang="zh-CN" dirty="0" smtClean="0"/>
+                <a:t>Training</a:t>
+              </a:r>
+              <a:endParaRPr kumimoji="1" lang="zh-CN" altLang="en-US" dirty="0"/>
+            </a:p>
+          </p:txBody>
+        </p:sp>
+        <p:pic>
+          <p:nvPicPr>
+            <p:cNvPr id="14" name="图片 13"/>
+            <p:cNvPicPr>
+              <a:picLocks noChangeAspect="1"/>
+            </p:cNvPicPr>
+            <p:nvPr/>
+          </p:nvPicPr>
+          <p:blipFill>
+            <a:blip r:embed="rId3"/>
+            <a:stretch>
+              <a:fillRect/>
+            </a:stretch>
+          </p:blipFill>
+          <p:spPr>
+            <a:xfrm>
+              <a:off x="1066800" y="2819400"/>
+              <a:ext cx="3283312" cy="3200400"/>
+            </a:xfrm>
+            <a:prstGeom prst="rect">
+              <a:avLst/>
+            </a:prstGeom>
+          </p:spPr>
+        </p:pic>
+      </p:grpSp>
     </p:spTree>
     <p:extLst>
       <p:ext uri="{BB962C8B-B14F-4D97-AF65-F5344CB8AC3E}">
@@ -3608,6 +3991,13 @@
   <p:clrMapOvr>
     <a:masterClrMapping/>
   </p:clrMapOvr>
+  <p:timing>
+    <p:tnLst>
+      <p:par>
+        <p:cTn xmlns:p14="http://schemas.microsoft.com/office/powerpoint/2010/main" id="1" dur="indefinite" restart="never" nodeType="tmRoot"/>
+      </p:par>
+    </p:tnLst>
+  </p:timing>
 </p:sld>
 </file>
 
@@ -3643,7 +4033,15 @@
           <a:bodyPr/>
           <a:lstStyle/>
           <a:p>
-            <a:endParaRPr lang="en-US"/>
+            <a:r>
+              <a:rPr lang="en-US" altLang="zh-CN" dirty="0"/>
+              <a:t>Pre-</a:t>
+            </a:r>
+            <a:r>
+              <a:rPr lang="en-US" altLang="zh-CN" dirty="0" smtClean="0"/>
+              <a:t>processing (Cont.)</a:t>
+            </a:r>
+            <a:endParaRPr lang="en-US" dirty="0"/>
           </a:p>
         </p:txBody>
       </p:sp>
@@ -3662,7 +4060,52 @@
           <a:bodyPr/>
           <a:lstStyle/>
           <a:p>
-            <a:endParaRPr lang="en-US"/>
+            <a:r>
+              <a:rPr lang="en-US" dirty="0" smtClean="0"/>
+              <a:t>Open Date</a:t>
+            </a:r>
+          </a:p>
+          <a:p>
+            <a:pPr lvl="1"/>
+            <a:r>
+              <a:rPr lang="en-US" dirty="0" smtClean="0"/>
+              <a:t>Convert from string to numeric type</a:t>
+            </a:r>
+          </a:p>
+          <a:p>
+            <a:pPr lvl="1"/>
+            <a:r>
+              <a:rPr lang="en-US" dirty="0" smtClean="0"/>
+              <a:t>Days opened till 2/1/2014</a:t>
+            </a:r>
+          </a:p>
+          <a:p>
+            <a:r>
+              <a:rPr lang="en-US" dirty="0" smtClean="0"/>
+              <a:t>Feature Scaling</a:t>
+            </a:r>
+          </a:p>
+          <a:p>
+            <a:pPr lvl="1"/>
+            <a:r>
+              <a:rPr lang="en-US" dirty="0" smtClean="0"/>
+              <a:t>Standardize</a:t>
+            </a:r>
+          </a:p>
+          <a:p>
+            <a:pPr lvl="1"/>
+            <a:r>
+              <a:rPr lang="en-US" dirty="0" smtClean="0"/>
+              <a:t>zero mean</a:t>
+            </a:r>
+          </a:p>
+          <a:p>
+            <a:pPr lvl="1"/>
+            <a:r>
+              <a:rPr lang="en-US" dirty="0" smtClean="0"/>
+              <a:t>unit variance</a:t>
+            </a:r>
+            <a:endParaRPr lang="en-US" dirty="0" smtClean="0"/>
           </a:p>
         </p:txBody>
       </p:sp>
@@ -3676,6 +4119,13 @@
   <p:clrMapOvr>
     <a:masterClrMapping/>
   </p:clrMapOvr>
+  <p:timing>
+    <p:tnLst>
+      <p:par>
+        <p:cTn xmlns:p14="http://schemas.microsoft.com/office/powerpoint/2010/main" id="1" dur="indefinite" restart="never" nodeType="tmRoot"/>
+      </p:par>
+    </p:tnLst>
+  </p:timing>
 </p:sld>
 </file>
 
@@ -3698,6 +4148,106 @@
       </p:grpSpPr>
       <p:sp>
         <p:nvSpPr>
+          <p:cNvPr id="2" name="标题 1"/>
+          <p:cNvSpPr>
+            <a:spLocks noGrp="1"/>
+          </p:cNvSpPr>
+          <p:nvPr>
+            <p:ph type="title"/>
+          </p:nvPr>
+        </p:nvSpPr>
+        <p:spPr/>
+        <p:txBody>
+          <a:bodyPr/>
+          <a:lstStyle/>
+          <a:p>
+            <a:r>
+              <a:rPr kumimoji="1" lang="en-US" altLang="zh-CN" dirty="0" smtClean="0"/>
+              <a:t>Exploring the Data</a:t>
+            </a:r>
+            <a:endParaRPr kumimoji="1" lang="zh-CN" altLang="en-US" dirty="0"/>
+          </a:p>
+        </p:txBody>
+      </p:sp>
+      <p:sp>
+        <p:nvSpPr>
+          <p:cNvPr id="3" name="内容占位符 2"/>
+          <p:cNvSpPr>
+            <a:spLocks noGrp="1"/>
+          </p:cNvSpPr>
+          <p:nvPr>
+            <p:ph idx="1"/>
+          </p:nvPr>
+        </p:nvSpPr>
+        <p:spPr/>
+        <p:txBody>
+          <a:bodyPr/>
+          <a:lstStyle/>
+          <a:p>
+            <a:r>
+              <a:rPr kumimoji="1" lang="en-US" altLang="zh-CN" dirty="0" smtClean="0"/>
+              <a:t>Days opened is the most correlated attribute </a:t>
+            </a:r>
+            <a:endParaRPr kumimoji="1" lang="zh-CN" altLang="en-US" dirty="0"/>
+          </a:p>
+        </p:txBody>
+      </p:sp>
+      <p:pic>
+        <p:nvPicPr>
+          <p:cNvPr id="5" name="图片 4"/>
+          <p:cNvPicPr>
+            <a:picLocks noChangeAspect="1"/>
+          </p:cNvPicPr>
+          <p:nvPr/>
+        </p:nvPicPr>
+        <p:blipFill>
+          <a:blip r:embed="rId2"/>
+          <a:stretch>
+            <a:fillRect/>
+          </a:stretch>
+        </p:blipFill>
+        <p:spPr>
+          <a:xfrm>
+            <a:off x="1866056" y="2321939"/>
+            <a:ext cx="5079820" cy="4280309"/>
+          </a:xfrm>
+          <a:prstGeom prst="rect">
+            <a:avLst/>
+          </a:prstGeom>
+        </p:spPr>
+      </p:pic>
+    </p:spTree>
+    <p:extLst>
+      <p:ext uri="{BB962C8B-B14F-4D97-AF65-F5344CB8AC3E}">
+        <p14:creationId xmlns:p14="http://schemas.microsoft.com/office/powerpoint/2010/main" val="1383306667"/>
+      </p:ext>
+    </p:extLst>
+  </p:cSld>
+  <p:clrMapOvr>
+    <a:masterClrMapping/>
+  </p:clrMapOvr>
+</p:sld>
+</file>
+
+<file path=ppt/slides/slide7.xml><?xml version="1.0" encoding="utf-8"?>
+<p:sld xmlns:a="http://schemas.openxmlformats.org/drawingml/2006/main" xmlns:r="http://schemas.openxmlformats.org/officeDocument/2006/relationships" xmlns:p="http://schemas.openxmlformats.org/presentationml/2006/main">
+  <p:cSld>
+    <p:spTree>
+      <p:nvGrpSpPr>
+        <p:cNvPr id="1" name=""/>
+        <p:cNvGrpSpPr/>
+        <p:nvPr/>
+      </p:nvGrpSpPr>
+      <p:grpSpPr>
+        <a:xfrm>
+          <a:off x="0" y="0"/>
+          <a:ext cx="0" cy="0"/>
+          <a:chOff x="0" y="0"/>
+          <a:chExt cx="0" cy="0"/>
+        </a:xfrm>
+      </p:grpSpPr>
+      <p:sp>
+        <p:nvSpPr>
           <p:cNvPr id="2" name="Title 1"/>
           <p:cNvSpPr>
             <a:spLocks noGrp="1"/>
@@ -3731,10 +4281,78 @@
         </p:nvSpPr>
         <p:spPr/>
         <p:txBody>
-          <a:bodyPr/>
-          <a:lstStyle/>
-          <a:p>
-            <a:endParaRPr lang="en-US"/>
+          <a:bodyPr>
+            <a:normAutofit/>
+          </a:bodyPr>
+          <a:lstStyle/>
+          <a:p>
+            <a:r>
+              <a:rPr lang="en-US" dirty="0" smtClean="0"/>
+              <a:t>Train single model</a:t>
+            </a:r>
+          </a:p>
+          <a:p>
+            <a:pPr lvl="1"/>
+            <a:r>
+              <a:rPr lang="en-US" dirty="0" err="1" smtClean="0"/>
+              <a:t>NuSVR</a:t>
+            </a:r>
+            <a:endParaRPr lang="en-US" dirty="0" smtClean="0"/>
+          </a:p>
+          <a:p>
+            <a:pPr lvl="1"/>
+            <a:r>
+              <a:rPr lang="en-US" dirty="0" smtClean="0"/>
+              <a:t>K Nearest Neighbor</a:t>
+            </a:r>
+          </a:p>
+          <a:p>
+            <a:pPr lvl="1"/>
+            <a:r>
+              <a:rPr lang="en-US" altLang="zh-CN" dirty="0" smtClean="0"/>
+              <a:t>Gradient Boosting </a:t>
+            </a:r>
+            <a:r>
+              <a:rPr lang="en-US" altLang="zh-CN" dirty="0" err="1" smtClean="0"/>
+              <a:t>Regressor</a:t>
+            </a:r>
+            <a:endParaRPr lang="en-US" altLang="zh-CN" dirty="0" smtClean="0"/>
+          </a:p>
+          <a:p>
+            <a:r>
+              <a:rPr lang="en-US" altLang="zh-CN" dirty="0" smtClean="0"/>
+              <a:t>Parameters turned based on 5-folds cross validation</a:t>
+            </a:r>
+            <a:endParaRPr lang="en-US" altLang="zh-CN" dirty="0"/>
+          </a:p>
+          <a:p>
+            <a:r>
+              <a:rPr lang="en-US" dirty="0" smtClean="0"/>
+              <a:t>Average the prediction results</a:t>
+            </a:r>
+          </a:p>
+          <a:p>
+            <a:r>
+              <a:rPr lang="en-US" dirty="0" smtClean="0"/>
+              <a:t>Python + </a:t>
+            </a:r>
+            <a:r>
+              <a:rPr lang="en-US" altLang="zh-CN" dirty="0" err="1"/>
+              <a:t>scikit</a:t>
+            </a:r>
+            <a:r>
+              <a:rPr lang="en-US" altLang="zh-CN" dirty="0"/>
+              <a:t>-</a:t>
+            </a:r>
+            <a:r>
+              <a:rPr lang="en-US" altLang="zh-CN" dirty="0" smtClean="0"/>
+              <a:t>learn </a:t>
+            </a:r>
+            <a:r>
+              <a:rPr lang="en-US" dirty="0" smtClean="0"/>
+              <a:t>library</a:t>
+            </a:r>
+            <a:endParaRPr lang="en-US" dirty="0"/>
           </a:p>
         </p:txBody>
       </p:sp>
@@ -3748,6 +4366,445 @@
   <p:clrMapOvr>
     <a:masterClrMapping/>
   </p:clrMapOvr>
+  <p:timing>
+    <p:tnLst>
+      <p:par>
+        <p:cTn xmlns:p14="http://schemas.microsoft.com/office/powerpoint/2010/main" id="1" dur="indefinite" restart="never" nodeType="tmRoot"/>
+      </p:par>
+    </p:tnLst>
+  </p:timing>
+</p:sld>
+</file>
+
+<file path=ppt/slides/slide8.xml><?xml version="1.0" encoding="utf-8"?>
+<p:sld xmlns:a="http://schemas.openxmlformats.org/drawingml/2006/main" xmlns:r="http://schemas.openxmlformats.org/officeDocument/2006/relationships" xmlns:p="http://schemas.openxmlformats.org/presentationml/2006/main">
+  <p:cSld>
+    <p:spTree>
+      <p:nvGrpSpPr>
+        <p:cNvPr id="1" name=""/>
+        <p:cNvGrpSpPr/>
+        <p:nvPr/>
+      </p:nvGrpSpPr>
+      <p:grpSpPr>
+        <a:xfrm>
+          <a:off x="0" y="0"/>
+          <a:ext cx="0" cy="0"/>
+          <a:chOff x="0" y="0"/>
+          <a:chExt cx="0" cy="0"/>
+        </a:xfrm>
+      </p:grpSpPr>
+      <p:sp>
+        <p:nvSpPr>
+          <p:cNvPr id="2" name="标题 1"/>
+          <p:cNvSpPr>
+            <a:spLocks noGrp="1"/>
+          </p:cNvSpPr>
+          <p:nvPr>
+            <p:ph type="title"/>
+          </p:nvPr>
+        </p:nvSpPr>
+        <p:spPr>
+          <a:xfrm>
+            <a:off x="457200" y="274638"/>
+            <a:ext cx="8229600" cy="411162"/>
+          </a:xfrm>
+        </p:spPr>
+        <p:txBody>
+          <a:bodyPr>
+            <a:normAutofit fontScale="90000"/>
+          </a:bodyPr>
+          <a:lstStyle/>
+          <a:p>
+            <a:r>
+              <a:rPr kumimoji="1" lang="en-US" altLang="zh-CN" dirty="0" smtClean="0"/>
+              <a:t>Issues</a:t>
+            </a:r>
+            <a:endParaRPr kumimoji="1" lang="zh-CN" altLang="en-US" dirty="0"/>
+          </a:p>
+        </p:txBody>
+      </p:sp>
+      <p:sp>
+        <p:nvSpPr>
+          <p:cNvPr id="3" name="内容占位符 2"/>
+          <p:cNvSpPr>
+            <a:spLocks noGrp="1"/>
+          </p:cNvSpPr>
+          <p:nvPr>
+            <p:ph idx="1"/>
+          </p:nvPr>
+        </p:nvSpPr>
+        <p:spPr>
+          <a:xfrm>
+            <a:off x="533400" y="838200"/>
+            <a:ext cx="8229600" cy="4525963"/>
+          </a:xfrm>
+        </p:spPr>
+        <p:txBody>
+          <a:bodyPr/>
+          <a:lstStyle/>
+          <a:p>
+            <a:r>
+              <a:rPr kumimoji="1" lang="en-US" altLang="zh-CN" dirty="0" smtClean="0"/>
+              <a:t>Overfitting (training set is too small)</a:t>
+            </a:r>
+          </a:p>
+          <a:p>
+            <a:r>
+              <a:rPr kumimoji="1" lang="en-US" altLang="zh-CN" dirty="0" smtClean="0"/>
+              <a:t>Cross validation can not estimate the performance on test set</a:t>
+            </a:r>
+            <a:endParaRPr kumimoji="1" lang="zh-CN" altLang="en-US" dirty="0"/>
+          </a:p>
+        </p:txBody>
+      </p:sp>
+      <p:pic>
+        <p:nvPicPr>
+          <p:cNvPr id="4" name="图片 3"/>
+          <p:cNvPicPr>
+            <a:picLocks noChangeAspect="1"/>
+          </p:cNvPicPr>
+          <p:nvPr/>
+        </p:nvPicPr>
+        <p:blipFill>
+          <a:blip r:embed="rId2">
+            <a:extLst>
+              <a:ext uri="{28A0092B-C50C-407E-A947-70E740481C1C}">
+                <a14:useLocalDpi xmlns:a14="http://schemas.microsoft.com/office/drawing/2010/main" val="0"/>
+              </a:ext>
+            </a:extLst>
+          </a:blip>
+          <a:stretch>
+            <a:fillRect/>
+          </a:stretch>
+        </p:blipFill>
+        <p:spPr>
+          <a:xfrm>
+            <a:off x="1600200" y="2487928"/>
+            <a:ext cx="5826762" cy="4370072"/>
+          </a:xfrm>
+          <a:prstGeom prst="rect">
+            <a:avLst/>
+          </a:prstGeom>
+        </p:spPr>
+      </p:pic>
+      <p:sp>
+        <p:nvSpPr>
+          <p:cNvPr id="5" name="线形标注 1 4"/>
+          <p:cNvSpPr/>
+          <p:nvPr/>
+        </p:nvSpPr>
+        <p:spPr>
+          <a:xfrm>
+            <a:off x="3657600" y="4724400"/>
+            <a:ext cx="1295400" cy="457200"/>
+          </a:xfrm>
+          <a:prstGeom prst="borderCallout1">
+            <a:avLst>
+              <a:gd name="adj1" fmla="val 18750"/>
+              <a:gd name="adj2" fmla="val -8333"/>
+              <a:gd name="adj3" fmla="val 217365"/>
+              <a:gd name="adj4" fmla="val -37333"/>
+            </a:avLst>
+          </a:prstGeom>
+        </p:spPr>
+        <p:style>
+          <a:lnRef idx="2">
+            <a:schemeClr val="accent2"/>
+          </a:lnRef>
+          <a:fillRef idx="1">
+            <a:schemeClr val="lt1"/>
+          </a:fillRef>
+          <a:effectRef idx="0">
+            <a:schemeClr val="accent2"/>
+          </a:effectRef>
+          <a:fontRef idx="minor">
+            <a:schemeClr val="dk1"/>
+          </a:fontRef>
+        </p:style>
+        <p:txBody>
+          <a:bodyPr rtlCol="0" anchor="ctr"/>
+          <a:lstStyle/>
+          <a:p>
+            <a:pPr algn="ctr"/>
+            <a:r>
+              <a:rPr kumimoji="1" lang="en-US" altLang="zh-CN" dirty="0" smtClean="0"/>
+              <a:t>Rank 115</a:t>
+            </a:r>
+            <a:endParaRPr kumimoji="1" lang="zh-CN" altLang="en-US" dirty="0"/>
+          </a:p>
+        </p:txBody>
+      </p:sp>
+      <p:sp>
+        <p:nvSpPr>
+          <p:cNvPr id="6" name="线形标注 1 5"/>
+          <p:cNvSpPr/>
+          <p:nvPr/>
+        </p:nvSpPr>
+        <p:spPr>
+          <a:xfrm flipH="1">
+            <a:off x="2667000" y="3581400"/>
+            <a:ext cx="1295400" cy="457200"/>
+          </a:xfrm>
+          <a:prstGeom prst="borderCallout1">
+            <a:avLst>
+              <a:gd name="adj1" fmla="val 18750"/>
+              <a:gd name="adj2" fmla="val -8333"/>
+              <a:gd name="adj3" fmla="val -49049"/>
+              <a:gd name="adj4" fmla="val -43335"/>
+            </a:avLst>
+          </a:prstGeom>
+        </p:spPr>
+        <p:style>
+          <a:lnRef idx="2">
+            <a:schemeClr val="accent2"/>
+          </a:lnRef>
+          <a:fillRef idx="1">
+            <a:schemeClr val="lt1"/>
+          </a:fillRef>
+          <a:effectRef idx="0">
+            <a:schemeClr val="accent2"/>
+          </a:effectRef>
+          <a:fontRef idx="minor">
+            <a:schemeClr val="dk1"/>
+          </a:fontRef>
+        </p:style>
+        <p:txBody>
+          <a:bodyPr rtlCol="0" anchor="ctr"/>
+          <a:lstStyle/>
+          <a:p>
+            <a:pPr algn="ctr"/>
+            <a:r>
+              <a:rPr kumimoji="1" lang="en-US" altLang="zh-CN" dirty="0" smtClean="0"/>
+              <a:t>Rank 1890</a:t>
+            </a:r>
+            <a:endParaRPr kumimoji="1" lang="zh-CN" altLang="en-US" dirty="0"/>
+          </a:p>
+        </p:txBody>
+      </p:sp>
+      <p:sp>
+        <p:nvSpPr>
+          <p:cNvPr id="7" name="线形标注 1 6"/>
+          <p:cNvSpPr/>
+          <p:nvPr/>
+        </p:nvSpPr>
+        <p:spPr>
+          <a:xfrm>
+            <a:off x="5715000" y="4343400"/>
+            <a:ext cx="1295400" cy="457200"/>
+          </a:xfrm>
+          <a:prstGeom prst="borderCallout1">
+            <a:avLst>
+              <a:gd name="adj1" fmla="val 18750"/>
+              <a:gd name="adj2" fmla="val -8333"/>
+              <a:gd name="adj3" fmla="val 135174"/>
+              <a:gd name="adj4" fmla="val -25329"/>
+            </a:avLst>
+          </a:prstGeom>
+        </p:spPr>
+        <p:style>
+          <a:lnRef idx="2">
+            <a:schemeClr val="accent2"/>
+          </a:lnRef>
+          <a:fillRef idx="1">
+            <a:schemeClr val="lt1"/>
+          </a:fillRef>
+          <a:effectRef idx="0">
+            <a:schemeClr val="accent2"/>
+          </a:effectRef>
+          <a:fontRef idx="minor">
+            <a:schemeClr val="dk1"/>
+          </a:fontRef>
+        </p:style>
+        <p:txBody>
+          <a:bodyPr rtlCol="0" anchor="ctr"/>
+          <a:lstStyle/>
+          <a:p>
+            <a:pPr algn="ctr"/>
+            <a:r>
+              <a:rPr kumimoji="1" lang="en-US" altLang="zh-CN" dirty="0" smtClean="0"/>
+              <a:t>Rank 866</a:t>
+            </a:r>
+            <a:endParaRPr kumimoji="1" lang="zh-CN" altLang="en-US" dirty="0"/>
+          </a:p>
+        </p:txBody>
+      </p:sp>
+    </p:spTree>
+    <p:extLst>
+      <p:ext uri="{BB962C8B-B14F-4D97-AF65-F5344CB8AC3E}">
+        <p14:creationId xmlns:p14="http://schemas.microsoft.com/office/powerpoint/2010/main" val="4262006165"/>
+      </p:ext>
+    </p:extLst>
+  </p:cSld>
+  <p:clrMapOvr>
+    <a:masterClrMapping/>
+  </p:clrMapOvr>
+  <p:timing>
+    <p:tnLst>
+      <p:par>
+        <p:cTn xmlns:p14="http://schemas.microsoft.com/office/powerpoint/2010/main" id="1" dur="indefinite" restart="never" nodeType="tmRoot"/>
+      </p:par>
+    </p:tnLst>
+  </p:timing>
+</p:sld>
+</file>
+
+<file path=ppt/slides/slide9.xml><?xml version="1.0" encoding="utf-8"?>
+<p:sld xmlns:a="http://schemas.openxmlformats.org/drawingml/2006/main" xmlns:r="http://schemas.openxmlformats.org/officeDocument/2006/relationships" xmlns:p="http://schemas.openxmlformats.org/presentationml/2006/main">
+  <p:cSld>
+    <p:spTree>
+      <p:nvGrpSpPr>
+        <p:cNvPr id="1" name=""/>
+        <p:cNvGrpSpPr/>
+        <p:nvPr/>
+      </p:nvGrpSpPr>
+      <p:grpSpPr>
+        <a:xfrm>
+          <a:off x="0" y="0"/>
+          <a:ext cx="0" cy="0"/>
+          <a:chOff x="0" y="0"/>
+          <a:chExt cx="0" cy="0"/>
+        </a:xfrm>
+      </p:grpSpPr>
+      <p:sp>
+        <p:nvSpPr>
+          <p:cNvPr id="2" name="标题 1"/>
+          <p:cNvSpPr>
+            <a:spLocks noGrp="1"/>
+          </p:cNvSpPr>
+          <p:nvPr>
+            <p:ph type="title"/>
+          </p:nvPr>
+        </p:nvSpPr>
+        <p:spPr/>
+        <p:txBody>
+          <a:bodyPr/>
+          <a:lstStyle/>
+          <a:p>
+            <a:r>
+              <a:rPr kumimoji="1" lang="en-US" altLang="zh-CN" dirty="0" smtClean="0"/>
+              <a:t>Results on Public Board</a:t>
+            </a:r>
+            <a:endParaRPr kumimoji="1" lang="zh-CN" altLang="en-US" dirty="0"/>
+          </a:p>
+        </p:txBody>
+      </p:sp>
+      <p:sp>
+        <p:nvSpPr>
+          <p:cNvPr id="3" name="内容占位符 2"/>
+          <p:cNvSpPr>
+            <a:spLocks noGrp="1"/>
+          </p:cNvSpPr>
+          <p:nvPr>
+            <p:ph idx="1"/>
+          </p:nvPr>
+        </p:nvSpPr>
+        <p:spPr/>
+        <p:txBody>
+          <a:bodyPr/>
+          <a:lstStyle/>
+          <a:p>
+            <a:r>
+              <a:rPr kumimoji="1" lang="en-US" altLang="zh-CN" dirty="0" smtClean="0"/>
+              <a:t>Rank 1xx / 22xx teams</a:t>
+            </a:r>
+            <a:endParaRPr kumimoji="1" lang="zh-CN" altLang="en-US" dirty="0"/>
+          </a:p>
+        </p:txBody>
+      </p:sp>
+      <p:pic>
+        <p:nvPicPr>
+          <p:cNvPr id="4" name="图片 3"/>
+          <p:cNvPicPr>
+            <a:picLocks noChangeAspect="1"/>
+          </p:cNvPicPr>
+          <p:nvPr/>
+        </p:nvPicPr>
+        <p:blipFill>
+          <a:blip r:embed="rId2">
+            <a:extLst>
+              <a:ext uri="{28A0092B-C50C-407E-A947-70E740481C1C}">
+                <a14:useLocalDpi xmlns:a14="http://schemas.microsoft.com/office/drawing/2010/main" val="0"/>
+              </a:ext>
+            </a:extLst>
+          </a:blip>
+          <a:stretch>
+            <a:fillRect/>
+          </a:stretch>
+        </p:blipFill>
+        <p:spPr>
+          <a:xfrm>
+            <a:off x="1295400" y="2057400"/>
+            <a:ext cx="6400800" cy="4800600"/>
+          </a:xfrm>
+          <a:prstGeom prst="rect">
+            <a:avLst/>
+          </a:prstGeom>
+        </p:spPr>
+      </p:pic>
+      <p:sp>
+        <p:nvSpPr>
+          <p:cNvPr id="5" name="线形标注 1 4"/>
+          <p:cNvSpPr/>
+          <p:nvPr/>
+        </p:nvSpPr>
+        <p:spPr>
+          <a:xfrm>
+            <a:off x="3048000" y="3962400"/>
+            <a:ext cx="1905000" cy="609600"/>
+          </a:xfrm>
+          <a:prstGeom prst="borderCallout1">
+            <a:avLst>
+              <a:gd name="adj1" fmla="val 18750"/>
+              <a:gd name="adj2" fmla="val -8333"/>
+              <a:gd name="adj3" fmla="val 280426"/>
+              <a:gd name="adj4" fmla="val -40374"/>
+            </a:avLst>
+          </a:prstGeom>
+        </p:spPr>
+        <p:style>
+          <a:lnRef idx="2">
+            <a:schemeClr val="accent2"/>
+          </a:lnRef>
+          <a:fillRef idx="1">
+            <a:schemeClr val="lt1"/>
+          </a:fillRef>
+          <a:effectRef idx="0">
+            <a:schemeClr val="accent2"/>
+          </a:effectRef>
+          <a:fontRef idx="minor">
+            <a:schemeClr val="dk1"/>
+          </a:fontRef>
+        </p:style>
+        <p:txBody>
+          <a:bodyPr rtlCol="0" anchor="ctr"/>
+          <a:lstStyle/>
+          <a:p>
+            <a:pPr algn="ctr"/>
+            <a:r>
+              <a:rPr kumimoji="1" lang="en-US" altLang="zh-CN" dirty="0" smtClean="0"/>
+              <a:t>We are here</a:t>
+            </a:r>
+            <a:endParaRPr kumimoji="1" lang="zh-CN" altLang="en-US" dirty="0"/>
+          </a:p>
+        </p:txBody>
+      </p:sp>
+    </p:spTree>
+    <p:extLst>
+      <p:ext uri="{BB962C8B-B14F-4D97-AF65-F5344CB8AC3E}">
+        <p14:creationId xmlns:p14="http://schemas.microsoft.com/office/powerpoint/2010/main" val="4030098551"/>
+      </p:ext>
+    </p:extLst>
+  </p:cSld>
+  <p:clrMapOvr>
+    <a:masterClrMapping/>
+  </p:clrMapOvr>
+  <p:timing>
+    <p:tnLst>
+      <p:par>
+        <p:cTn xmlns:p14="http://schemas.microsoft.com/office/powerpoint/2010/main" id="1" dur="indefinite" restart="never" nodeType="tmRoot"/>
+      </p:par>
+    </p:tnLst>
+  </p:timing>
 </p:sld>
 </file>
 

</xml_diff>